<commit_message>
Added Software Installation doc. Added Abhay's Guidebook. Updated lessons.
</commit_message>
<xml_diff>
--- a/Lesson1/AdvancedRoboticsLesson1.pptx
+++ b/Lesson1/AdvancedRoboticsLesson1.pptx
@@ -206,7 +206,7 @@
           <a:p>
             <a:fld id="{9DF9AC4D-2BB8-495E-BEDA-2E87103D7605}" type="datetimeFigureOut">
               <a:rPr lang="en-US" smtClean="0"/>
-              <a:t>11/12/2020</a:t>
+              <a:t>7/10/2023</a:t>
             </a:fld>
             <a:endParaRPr lang="en-US"/>
           </a:p>
@@ -1064,7 +1064,7 @@
             <a:fld id="{5923F103-BC34-4FE4-A40E-EDDEECFDA5D0}" type="datetimeFigureOut">
               <a:rPr lang="en-US" dirty="0"/>
               <a:pPr/>
-              <a:t>11/12/2020</a:t>
+              <a:t>7/10/2023</a:t>
             </a:fld>
             <a:endParaRPr lang="en-US" dirty="0"/>
           </a:p>
@@ -2148,7 +2148,7 @@
           <a:p>
             <a:fld id="{923A1CC3-2375-41D4-9E03-427CAF2A4C1A}" type="datetimeFigureOut">
               <a:rPr lang="en-US" dirty="0"/>
-              <a:t>11/12/2020</a:t>
+              <a:t>7/10/2023</a:t>
             </a:fld>
             <a:endParaRPr lang="en-US" dirty="0"/>
           </a:p>
@@ -3124,7 +3124,7 @@
           <a:p>
             <a:fld id="{AFF16868-8199-4C2C-A5B1-63AEE139F88E}" type="datetimeFigureOut">
               <a:rPr lang="en-US" dirty="0"/>
-              <a:t>11/12/2020</a:t>
+              <a:t>7/10/2023</a:t>
             </a:fld>
             <a:endParaRPr lang="en-US" dirty="0"/>
           </a:p>
@@ -4254,7 +4254,7 @@
           <a:p>
             <a:fld id="{AAD9FF7F-6988-44CC-821B-644E70CD2F73}" type="datetimeFigureOut">
               <a:rPr lang="en-US" dirty="0"/>
-              <a:t>11/12/2020</a:t>
+              <a:t>7/10/2023</a:t>
             </a:fld>
             <a:endParaRPr lang="en-US" dirty="0"/>
           </a:p>
@@ -5283,7 +5283,7 @@
           <a:p>
             <a:fld id="{5C12C299-16B2-4475-990D-751901EACC14}" type="datetimeFigureOut">
               <a:rPr lang="en-US" dirty="0"/>
-              <a:t>11/12/2020</a:t>
+              <a:t>7/10/2023</a:t>
             </a:fld>
             <a:endParaRPr lang="en-US" dirty="0"/>
           </a:p>
@@ -5939,7 +5939,7 @@
           <a:p>
             <a:fld id="{9FE86839-B9D8-4651-8783-F325ECE74E65}" type="datetimeFigureOut">
               <a:rPr lang="en-US" dirty="0"/>
-              <a:t>11/12/2020</a:t>
+              <a:t>7/10/2023</a:t>
             </a:fld>
             <a:endParaRPr lang="en-US" dirty="0"/>
           </a:p>
@@ -6796,7 +6796,7 @@
           <a:p>
             <a:fld id="{FD484F64-32F6-45C5-931F-ADC1662401D0}" type="datetimeFigureOut">
               <a:rPr lang="en-US" dirty="0"/>
-              <a:t>11/12/2020</a:t>
+              <a:t>7/10/2023</a:t>
             </a:fld>
             <a:endParaRPr lang="en-US" dirty="0"/>
           </a:p>
@@ -6982,7 +6982,7 @@
           <a:p>
             <a:fld id="{53086D93-FCAC-47E0-A2EE-787E62CA814C}" type="datetimeFigureOut">
               <a:rPr lang="en-US" dirty="0"/>
-              <a:t>11/12/2020</a:t>
+              <a:t>7/10/2023</a:t>
             </a:fld>
             <a:endParaRPr lang="en-US" dirty="0"/>
           </a:p>
@@ -7950,7 +7950,7 @@
           <a:p>
             <a:fld id="{CDA879A6-0FD0-4734-A311-86BFCA472E6E}" type="datetimeFigureOut">
               <a:rPr lang="en-US" dirty="0"/>
-              <a:t>11/12/2020</a:t>
+              <a:t>7/10/2023</a:t>
             </a:fld>
             <a:endParaRPr lang="en-US" dirty="0"/>
           </a:p>
@@ -8157,7 +8157,7 @@
           <a:p>
             <a:fld id="{19C9CA7B-DFD4-44B5-8C60-D14B8CD1FB59}" type="datetimeFigureOut">
               <a:rPr lang="en-US" dirty="0"/>
-              <a:t>11/12/2020</a:t>
+              <a:t>7/10/2023</a:t>
             </a:fld>
             <a:endParaRPr lang="en-US" dirty="0"/>
           </a:p>
@@ -9187,7 +9187,7 @@
           <a:p>
             <a:fld id="{F34E6425-0181-43F2-84FC-787E803FD2F8}" type="datetimeFigureOut">
               <a:rPr lang="en-US" dirty="0"/>
-              <a:t>11/12/2020</a:t>
+              <a:t>7/10/2023</a:t>
             </a:fld>
             <a:endParaRPr lang="en-US" dirty="0"/>
           </a:p>
@@ -9455,7 +9455,7 @@
           <a:p>
             <a:fld id="{3BDB8791-F1B0-41E7-B7FD-A781E65C4266}" type="datetimeFigureOut">
               <a:rPr lang="en-US" dirty="0"/>
-              <a:t>11/12/2020</a:t>
+              <a:t>7/10/2023</a:t>
             </a:fld>
             <a:endParaRPr lang="en-US" dirty="0"/>
           </a:p>
@@ -9861,7 +9861,7 @@
           <a:p>
             <a:fld id="{5FDD63B2-E120-4ED8-B27B-C685F510A5FE}" type="datetimeFigureOut">
               <a:rPr lang="en-US" dirty="0"/>
-              <a:t>11/12/2020</a:t>
+              <a:t>7/10/2023</a:t>
             </a:fld>
             <a:endParaRPr lang="en-US" dirty="0"/>
           </a:p>
@@ -9984,7 +9984,7 @@
           <a:p>
             <a:fld id="{7AA18ACC-A947-437B-A130-35BD54FDF1E9}" type="datetimeFigureOut">
               <a:rPr lang="en-US" dirty="0"/>
-              <a:t>11/12/2020</a:t>
+              <a:t>7/10/2023</a:t>
             </a:fld>
             <a:endParaRPr lang="en-US" dirty="0"/>
           </a:p>
@@ -10075,7 +10075,7 @@
           <a:p>
             <a:fld id="{7C8D7E02-BCB8-4D50-A234-369438C08659}" type="datetimeFigureOut">
               <a:rPr lang="en-US" dirty="0"/>
-              <a:t>11/12/2020</a:t>
+              <a:t>7/10/2023</a:t>
             </a:fld>
             <a:endParaRPr lang="en-US" dirty="0"/>
           </a:p>
@@ -11152,7 +11152,7 @@
           <a:p>
             <a:fld id="{76E86A4C-8E40-4F87-A4F0-01A0687C5742}" type="datetimeFigureOut">
               <a:rPr lang="en-US" dirty="0"/>
-              <a:t>11/12/2020</a:t>
+              <a:t>7/10/2023</a:t>
             </a:fld>
             <a:endParaRPr lang="en-US" dirty="0"/>
           </a:p>
@@ -12256,7 +12256,7 @@
           <a:p>
             <a:fld id="{35E72C73-2D91-4E12-BA25-F0AA0C03599B}" type="datetimeFigureOut">
               <a:rPr lang="en-US" dirty="0"/>
-              <a:t>11/12/2020</a:t>
+              <a:t>7/10/2023</a:t>
             </a:fld>
             <a:endParaRPr lang="en-US" dirty="0"/>
           </a:p>
@@ -13249,7 +13249,7 @@
           <a:p>
             <a:fld id="{2BE451C3-0FF4-47C4-B829-773ADF60F88C}" type="datetimeFigureOut">
               <a:rPr lang="en-US" dirty="0"/>
-              <a:t>11/12/2020</a:t>
+              <a:t>7/10/2023</a:t>
             </a:fld>
             <a:endParaRPr lang="en-US" dirty="0"/>
           </a:p>
@@ -13955,13 +13955,13 @@
         </p:nvSpPr>
         <p:spPr>
           <a:xfrm>
-            <a:off x="584958" y="2231472"/>
-            <a:ext cx="8051115" cy="4626528"/>
+            <a:off x="584958" y="2362200"/>
+            <a:ext cx="8051115" cy="4495800"/>
           </a:xfrm>
         </p:spPr>
         <p:txBody>
           <a:bodyPr>
-            <a:normAutofit fontScale="47500" lnSpcReduction="20000"/>
+            <a:normAutofit fontScale="62500" lnSpcReduction="20000"/>
           </a:bodyPr>
           <a:lstStyle/>
           <a:p>
@@ -14019,23 +14019,7 @@
           <a:p>
             <a:r>
               <a:rPr lang="en-US" dirty="0"/>
-              <a:t>While in Autonomous mode, </a:t>
-            </a:r>
-            <a:r>
-              <a:rPr lang="en-US" dirty="0" err="1"/>
-              <a:t>runContinuous</a:t>
-            </a:r>
-            <a:r>
-              <a:rPr lang="en-US" dirty="0"/>
-              <a:t> in FrcAuto.java is called continuous in a loop and </a:t>
-            </a:r>
-            <a:r>
-              <a:rPr lang="en-US" dirty="0" err="1"/>
-              <a:t>runPeriodic</a:t>
-            </a:r>
-            <a:r>
-              <a:rPr lang="en-US" dirty="0"/>
-              <a:t> in FrcAuto.java is called approximate every 20 msec.</a:t>
+              <a:t>While in Autonomous mode, periodic in FrcAuto.java is called periodically in a loop.</a:t>
             </a:r>
           </a:p>
           <a:p>
@@ -14083,23 +14067,7 @@
           <a:p>
             <a:r>
               <a:rPr lang="en-US" dirty="0"/>
-              <a:t>While in Disabled mode, </a:t>
-            </a:r>
-            <a:r>
-              <a:rPr lang="en-US" dirty="0" err="1"/>
-              <a:t>runContinuous</a:t>
-            </a:r>
-            <a:r>
-              <a:rPr lang="en-US" dirty="0"/>
-              <a:t> in FrcDisabled.java is called continuous in a loop and </a:t>
-            </a:r>
-            <a:r>
-              <a:rPr lang="en-US" dirty="0" err="1"/>
-              <a:t>runPeriodic</a:t>
-            </a:r>
-            <a:r>
-              <a:rPr lang="en-US" dirty="0"/>
-              <a:t> in FrcDisabled.java is called approximate every 20 msec.</a:t>
+              <a:t>While in Disabled mode, periodic in FrcDisabled.java is called periodically in a loop.</a:t>
             </a:r>
           </a:p>
           <a:p>
@@ -14179,23 +14147,7 @@
             </a:r>
             <a:r>
               <a:rPr lang="en-US" dirty="0"/>
-              <a:t>, </a:t>
-            </a:r>
-            <a:r>
-              <a:rPr lang="en-US" dirty="0" err="1"/>
-              <a:t>runContinuous</a:t>
-            </a:r>
-            <a:r>
-              <a:rPr lang="en-US" dirty="0"/>
-              <a:t> in FrcTeleOp.java is called continuous in a loop and </a:t>
-            </a:r>
-            <a:r>
-              <a:rPr lang="en-US" dirty="0" err="1"/>
-              <a:t>runPeriodic</a:t>
-            </a:r>
-            <a:r>
-              <a:rPr lang="en-US" dirty="0"/>
-              <a:t> in FrcTeleOp.java is called approximate every 20 msec.</a:t>
+              <a:t>, periodic in FrcTeleOp.java is called periodically in a loop.</a:t>
             </a:r>
           </a:p>
           <a:p>
@@ -14267,33 +14219,17 @@
           <a:p>
             <a:r>
               <a:rPr lang="en-US" dirty="0"/>
-              <a:t>While in Disabled mode, </a:t>
-            </a:r>
-            <a:r>
-              <a:rPr lang="en-US" dirty="0" err="1"/>
-              <a:t>runContinuous</a:t>
-            </a:r>
-            <a:r>
-              <a:rPr lang="en-US" dirty="0"/>
-              <a:t> in FrcDisabled.java is called continuous in a loop and </a:t>
-            </a:r>
-            <a:r>
-              <a:rPr lang="en-US" dirty="0" err="1"/>
-              <a:t>runPeriodic</a:t>
-            </a:r>
-            <a:r>
-              <a:rPr lang="en-US" dirty="0"/>
-              <a:t> in FrcDisabled.java is called approximate every 20 msec.</a:t>
+              <a:t>While in Disabled mode, periodic in FrcDisabled.java is called periodically in a loop.</a:t>
             </a:r>
           </a:p>
         </p:txBody>
       </p:sp>
       <p:pic>
         <p:nvPicPr>
-          <p:cNvPr id="9" name="Picture 8">
+          <p:cNvPr id="7" name="Picture 6">
             <a:extLst>
               <a:ext uri="{FF2B5EF4-FFF2-40B4-BE49-F238E27FC236}">
-                <a16:creationId xmlns:a16="http://schemas.microsoft.com/office/drawing/2014/main" id="{D5CDD8CB-16E5-4191-BFF0-DFE72A34F63B}"/>
+                <a16:creationId xmlns:a16="http://schemas.microsoft.com/office/drawing/2014/main" id="{11C81221-1FB5-8E32-78EA-E3DED411FB1C}"/>
               </a:ext>
             </a:extLst>
           </p:cNvPr>
@@ -14310,7 +14246,7 @@
         </p:blipFill>
         <p:spPr>
           <a:xfrm>
-            <a:off x="8636073" y="2231472"/>
+            <a:off x="8636073" y="2296836"/>
             <a:ext cx="3143250" cy="4495800"/>
           </a:xfrm>
           <a:prstGeom prst="rect">
@@ -14431,7 +14367,7 @@
           <a:p>
             <a:r>
               <a:rPr lang="en-US" dirty="0"/>
-              <a:t>Class material is based on FRC robots but the TRC library lessons should still be applicable to FTC.</a:t>
+              <a:t>Class material is focused on FRC robots but the TRC library lessons should still be applicable to FTC.</a:t>
             </a:r>
           </a:p>
           <a:p>
@@ -14749,7 +14685,7 @@
                 <a:effectLst/>
                 <a:latin typeface="Calibri" panose="020F0502020204030204" pitchFamily="34" charset="0"/>
               </a:rPr>
-              <a:t>Install WPI Lib: Download zip file from </a:t>
+              <a:t>Install FRC software: Installation instructions can be found </a:t>
             </a:r>
             <a:r>
               <a:rPr lang="en-US" sz="1800" b="0" i="0" dirty="0">
@@ -14770,7 +14706,7 @@
                 <a:effectLst/>
                 <a:latin typeface="Calibri" panose="020F0502020204030204" pitchFamily="34" charset="0"/>
               </a:rPr>
-              <a:t>. Unzip the downloaded zip file and double click the installer to install WPI Lib. Windows will pop up a warning advising you not to run it. Click "More info" and "Run Anyway" to install the software. Installing </a:t>
+              <a:t>. This installs the </a:t>
             </a:r>
             <a:r>
               <a:rPr lang="en-US" sz="1800" b="0" i="0" dirty="0" err="1">
@@ -14790,7 +14726,7 @@
                 <a:effectLst/>
                 <a:latin typeface="Calibri" panose="020F0502020204030204" pitchFamily="34" charset="0"/>
               </a:rPr>
-              <a:t> will also install Visual Studio Code, an IDE (Integrated Development Environment), and JDK (Java Development Kit) for you.</a:t>
+              <a:t> that includes Visual Studio Code which is the IDE to develop Java code for FRC.</a:t>
             </a:r>
           </a:p>
           <a:p>
@@ -14802,7 +14738,7 @@
                 <a:effectLst/>
                 <a:latin typeface="Calibri" panose="020F0502020204030204" pitchFamily="34" charset="0"/>
               </a:rPr>
-              <a:t>Install 3rd Party Libraries: This is done inside Visual Studio Code. The instructions can be found </a:t>
+              <a:t>Optionally, you can also install the FRC Game Tools </a:t>
             </a:r>
             <a:r>
               <a:rPr lang="en-US" sz="1800" b="0" i="0" dirty="0">
@@ -14823,6 +14759,78 @@
                 <a:effectLst/>
                 <a:latin typeface="Calibri" panose="020F0502020204030204" pitchFamily="34" charset="0"/>
               </a:rPr>
+              <a:t> </a:t>
+            </a:r>
+            <a:r>
+              <a:rPr lang="en-US" dirty="0">
+                <a:solidFill>
+                  <a:srgbClr val="000000"/>
+                </a:solidFill>
+                <a:latin typeface="Calibri" panose="020F0502020204030204" pitchFamily="34" charset="0"/>
+              </a:rPr>
+              <a:t>which </a:t>
+            </a:r>
+            <a:r>
+              <a:rPr lang="en-US" sz="1800" b="0" i="0" dirty="0">
+                <a:solidFill>
+                  <a:srgbClr val="000000"/>
+                </a:solidFill>
+                <a:effectLst/>
+                <a:latin typeface="Calibri" panose="020F0502020204030204" pitchFamily="34" charset="0"/>
+              </a:rPr>
+              <a:t>contains FRC Driver Station and </a:t>
+            </a:r>
+            <a:r>
+              <a:rPr lang="en-US" sz="1800" b="0" i="0" dirty="0" err="1">
+                <a:solidFill>
+                  <a:srgbClr val="000000"/>
+                </a:solidFill>
+                <a:effectLst/>
+                <a:latin typeface="Calibri" panose="020F0502020204030204" pitchFamily="34" charset="0"/>
+              </a:rPr>
+              <a:t>RoboRIO</a:t>
+            </a:r>
+            <a:r>
+              <a:rPr lang="en-US" sz="1800" b="0" i="0" dirty="0">
+                <a:solidFill>
+                  <a:srgbClr val="000000"/>
+                </a:solidFill>
+                <a:effectLst/>
+                <a:latin typeface="Calibri" panose="020F0502020204030204" pitchFamily="34" charset="0"/>
+              </a:rPr>
+              <a:t> Imaging Tool.</a:t>
+            </a:r>
+          </a:p>
+          <a:p>
+            <a:r>
+              <a:rPr lang="en-US" sz="1800" b="0" i="0" dirty="0">
+                <a:solidFill>
+                  <a:srgbClr val="000000"/>
+                </a:solidFill>
+                <a:effectLst/>
+                <a:latin typeface="Calibri" panose="020F0502020204030204" pitchFamily="34" charset="0"/>
+              </a:rPr>
+              <a:t>Install 3rd Party Vendor Libraries: This is done inside Visual Studio Code. The instructions can be found </a:t>
+            </a:r>
+            <a:r>
+              <a:rPr lang="en-US" sz="1800" b="0" i="0" dirty="0">
+                <a:solidFill>
+                  <a:srgbClr val="000000"/>
+                </a:solidFill>
+                <a:effectLst/>
+                <a:latin typeface="Calibri" panose="020F0502020204030204" pitchFamily="34" charset="0"/>
+                <a:hlinkClick r:id="rId7"/>
+              </a:rPr>
+              <a:t>here</a:t>
+            </a:r>
+            <a:r>
+              <a:rPr lang="en-US" sz="1800" b="0" i="0" dirty="0">
+                <a:solidFill>
+                  <a:srgbClr val="000000"/>
+                </a:solidFill>
+                <a:effectLst/>
+                <a:latin typeface="Calibri" panose="020F0502020204030204" pitchFamily="34" charset="0"/>
+              </a:rPr>
               <a:t>. There are many 3rd party libraries. We don't need all of them. The must haves are listed below. If we need more, we can install them later.</a:t>
             </a:r>
           </a:p>
@@ -14943,7 +14951,7 @@
                 </a:solidFill>
                 <a:effectLst/>
                 <a:latin typeface="Calibri" panose="020F0502020204030204" pitchFamily="34" charset="0"/>
-                <a:hlinkClick r:id="rId7"/>
+                <a:hlinkClick r:id="rId8"/>
               </a:rPr>
               <a:t>here</a:t>
             </a:r>
@@ -15055,7 +15063,7 @@
             <a:pPr lvl="1"/>
             <a:r>
               <a:rPr lang="en-US" dirty="0"/>
-              <a:t>Disabled mode – the robot is ON but not operational, generally safe to work on the robot.</a:t>
+              <a:t>Disabled mode – the robot is powered ON but not operational, generally safe to work on the robot.</a:t>
             </a:r>
           </a:p>
           <a:p>
@@ -15215,7 +15223,9 @@
           </a:xfrm>
         </p:spPr>
         <p:txBody>
-          <a:bodyPr/>
+          <a:bodyPr>
+            <a:normAutofit/>
+          </a:bodyPr>
           <a:lstStyle/>
           <a:p>
             <a:r>
@@ -15258,52 +15268,31 @@
           <a:p>
             <a:pPr lvl="1"/>
             <a:r>
+              <a:rPr lang="en-US" dirty="0" err="1"/>
+              <a:t>TrcCommonLib</a:t>
+            </a:r>
+            <a:r>
               <a:rPr lang="en-US" dirty="0"/>
-              <a:t>common – contains commonly used command modules</a:t>
+              <a:t> – contains code modules that are shared between FTC and FRC.</a:t>
             </a:r>
           </a:p>
           <a:p>
             <a:pPr lvl="1"/>
             <a:r>
+              <a:rPr lang="en-US" dirty="0" err="1"/>
+              <a:t>TrcFrcLib</a:t>
+            </a:r>
+            <a:r>
               <a:rPr lang="en-US" dirty="0"/>
-              <a:t>team492 – contains the main competition code</a:t>
+              <a:t> - contains code modules that are specific to FRC.</a:t>
             </a:r>
           </a:p>
           <a:p>
             <a:pPr lvl="1"/>
             <a:r>
-              <a:rPr lang="en-US" dirty="0" err="1"/>
-              <a:t>frclib</a:t>
-            </a:r>
-            <a:r>
               <a:rPr lang="en-US" dirty="0"/>
-              <a:t> – contains FRC specific code of the library</a:t>
-            </a:r>
-          </a:p>
-          <a:p>
-            <a:pPr lvl="1"/>
-            <a:r>
-              <a:rPr lang="en-US" dirty="0" err="1"/>
-              <a:t>hallib</a:t>
-            </a:r>
-            <a:r>
-              <a:rPr lang="en-US" dirty="0"/>
-              <a:t> – contains Hardware Abstraction Layer of the library</a:t>
-            </a:r>
-          </a:p>
-          <a:p>
-            <a:pPr lvl="1"/>
-            <a:r>
-              <a:rPr lang="en-US" dirty="0" err="1"/>
-              <a:t>trclib</a:t>
-            </a:r>
-            <a:r>
-              <a:rPr lang="en-US" dirty="0"/>
-              <a:t> – contains platform agnostic code of the library</a:t>
-            </a:r>
-          </a:p>
-          <a:p>
-            <a:endParaRPr lang="en-US" dirty="0"/>
+              <a:t>team492 – contains the main competition code.</a:t>
+            </a:r>
           </a:p>
         </p:txBody>
       </p:sp>
@@ -15789,23 +15778,8 @@
           <a:p>
             <a:pPr lvl="1"/>
             <a:r>
-              <a:rPr lang="en-US" dirty="0" err="1"/>
-              <a:t>runPeriodic</a:t>
-            </a:r>
-            <a:r>
               <a:rPr lang="en-US" dirty="0"/>
-              <a:t> – is called periodically during the robot mode at an interval of approx. 20 msec and contains code to perform low frequency tasks such as reading human input or displaying status.</a:t>
-            </a:r>
-          </a:p>
-          <a:p>
-            <a:pPr lvl="1"/>
-            <a:r>
-              <a:rPr lang="en-US" dirty="0" err="1"/>
-              <a:t>runContinuous</a:t>
-            </a:r>
-            <a:r>
-              <a:rPr lang="en-US" dirty="0"/>
-              <a:t> – is called repeatedly and continuously during the robot mode and contains code to perform high frequency tasks such as PID controlled drive or autonomous state machines.</a:t>
+              <a:t>periodic – is called periodically during the robot mode to perform various low frequency tasks such as reading human input or displaying status or high frequency tasks such as PID controlled drive or autonomous state machines.</a:t>
             </a:r>
           </a:p>
         </p:txBody>

</xml_diff>